<commit_message>
Changed figures and added the results of comparison
</commit_message>
<xml_diff>
--- a/journalSwarmControl/pictures/pdf/MainExpFig.pptx
+++ b/journalSwarmControl/pictures/pdf/MainExpFig.pptx
@@ -7,7 +7,7 @@
   <p:sldIdLst>
     <p:sldId id="256" r:id="rId2"/>
   </p:sldIdLst>
-  <p:sldSz cx="6400800" cy="8321675"/>
+  <p:sldSz cx="6400800" cy="7315200"/>
   <p:notesSz cx="6858000" cy="9144000"/>
   <p:defaultTextStyle>
     <a:defPPr>
@@ -136,8 +136,8 @@
         </p:nvSpPr>
         <p:spPr>
           <a:xfrm>
-            <a:off x="480060" y="2585118"/>
-            <a:ext cx="5440680" cy="1783766"/>
+            <a:off x="480060" y="2272458"/>
+            <a:ext cx="5440680" cy="1568026"/>
           </a:xfrm>
         </p:spPr>
         <p:txBody>
@@ -164,8 +164,8 @@
         </p:nvSpPr>
         <p:spPr>
           <a:xfrm>
-            <a:off x="960120" y="4715616"/>
-            <a:ext cx="4480560" cy="2126650"/>
+            <a:off x="960120" y="4145280"/>
+            <a:ext cx="4480560" cy="1869440"/>
           </a:xfrm>
         </p:spPr>
         <p:txBody>
@@ -288,7 +288,7 @@
           <a:p>
             <a:fld id="{C040166C-2A5C-4A05-AE69-597178BFE27B}" type="datetimeFigureOut">
               <a:rPr lang="en-US" smtClean="0"/>
-              <a:t>8/4/2016</a:t>
+              <a:t>8/9/16</a:t>
             </a:fld>
             <a:endParaRPr lang="en-US"/>
           </a:p>
@@ -458,7 +458,7 @@
           <a:p>
             <a:fld id="{C040166C-2A5C-4A05-AE69-597178BFE27B}" type="datetimeFigureOut">
               <a:rPr lang="en-US" smtClean="0"/>
-              <a:t>8/4/2016</a:t>
+              <a:t>8/9/16</a:t>
             </a:fld>
             <a:endParaRPr lang="en-US"/>
           </a:p>
@@ -548,8 +548,8 @@
         </p:nvSpPr>
         <p:spPr>
           <a:xfrm>
-            <a:off x="4640580" y="310142"/>
-            <a:ext cx="1440180" cy="6628445"/>
+            <a:off x="4640580" y="272632"/>
+            <a:ext cx="1440180" cy="5826760"/>
           </a:xfrm>
         </p:spPr>
         <p:txBody>
@@ -576,8 +576,8 @@
         </p:nvSpPr>
         <p:spPr>
           <a:xfrm>
-            <a:off x="320040" y="310142"/>
-            <a:ext cx="4213860" cy="6628445"/>
+            <a:off x="320040" y="272632"/>
+            <a:ext cx="4213860" cy="5826760"/>
           </a:xfrm>
         </p:spPr>
         <p:txBody>
@@ -638,7 +638,7 @@
           <a:p>
             <a:fld id="{C040166C-2A5C-4A05-AE69-597178BFE27B}" type="datetimeFigureOut">
               <a:rPr lang="en-US" smtClean="0"/>
-              <a:t>8/4/2016</a:t>
+              <a:t>8/9/16</a:t>
             </a:fld>
             <a:endParaRPr lang="en-US"/>
           </a:p>
@@ -808,7 +808,7 @@
           <a:p>
             <a:fld id="{C040166C-2A5C-4A05-AE69-597178BFE27B}" type="datetimeFigureOut">
               <a:rPr lang="en-US" smtClean="0"/>
-              <a:t>8/4/2016</a:t>
+              <a:t>8/9/16</a:t>
             </a:fld>
             <a:endParaRPr lang="en-US"/>
           </a:p>
@@ -898,8 +898,8 @@
         </p:nvSpPr>
         <p:spPr>
           <a:xfrm>
-            <a:off x="505618" y="5347447"/>
-            <a:ext cx="5440680" cy="1652777"/>
+            <a:off x="505618" y="4700694"/>
+            <a:ext cx="5440680" cy="1452880"/>
           </a:xfrm>
         </p:spPr>
         <p:txBody>
@@ -930,8 +930,8 @@
         </p:nvSpPr>
         <p:spPr>
           <a:xfrm>
-            <a:off x="505618" y="3527085"/>
-            <a:ext cx="5440680" cy="1820366"/>
+            <a:off x="505618" y="3100497"/>
+            <a:ext cx="5440680" cy="1600200"/>
           </a:xfrm>
         </p:spPr>
         <p:txBody>
@@ -1054,7 +1054,7 @@
           <a:p>
             <a:fld id="{C040166C-2A5C-4A05-AE69-597178BFE27B}" type="datetimeFigureOut">
               <a:rPr lang="en-US" smtClean="0"/>
-              <a:t>8/4/2016</a:t>
+              <a:t>8/9/16</a:t>
             </a:fld>
             <a:endParaRPr lang="en-US"/>
           </a:p>
@@ -1167,8 +1167,8 @@
         </p:nvSpPr>
         <p:spPr>
           <a:xfrm>
-            <a:off x="320040" y="1812666"/>
-            <a:ext cx="2827020" cy="5125921"/>
+            <a:off x="320040" y="1593432"/>
+            <a:ext cx="2827020" cy="4505960"/>
           </a:xfrm>
         </p:spPr>
         <p:txBody>
@@ -1252,8 +1252,8 @@
         </p:nvSpPr>
         <p:spPr>
           <a:xfrm>
-            <a:off x="3253740" y="1812666"/>
-            <a:ext cx="2827020" cy="5125921"/>
+            <a:off x="3253740" y="1593432"/>
+            <a:ext cx="2827020" cy="4505960"/>
           </a:xfrm>
         </p:spPr>
         <p:txBody>
@@ -1342,7 +1342,7 @@
           <a:p>
             <a:fld id="{C040166C-2A5C-4A05-AE69-597178BFE27B}" type="datetimeFigureOut">
               <a:rPr lang="en-US" smtClean="0"/>
-              <a:t>8/4/2016</a:t>
+              <a:t>8/9/16</a:t>
             </a:fld>
             <a:endParaRPr lang="en-US"/>
           </a:p>
@@ -1432,8 +1432,8 @@
         </p:nvSpPr>
         <p:spPr>
           <a:xfrm>
-            <a:off x="320040" y="333253"/>
-            <a:ext cx="5760720" cy="1386946"/>
+            <a:off x="320040" y="292947"/>
+            <a:ext cx="5760720" cy="1219200"/>
           </a:xfrm>
         </p:spPr>
         <p:txBody>
@@ -1464,8 +1464,8 @@
         </p:nvSpPr>
         <p:spPr>
           <a:xfrm>
-            <a:off x="320041" y="1862747"/>
-            <a:ext cx="2828131" cy="776304"/>
+            <a:off x="320042" y="1637455"/>
+            <a:ext cx="2828131" cy="682413"/>
           </a:xfrm>
         </p:spPr>
         <p:txBody>
@@ -1529,8 +1529,8 @@
         </p:nvSpPr>
         <p:spPr>
           <a:xfrm>
-            <a:off x="320041" y="2639051"/>
-            <a:ext cx="2828131" cy="4794596"/>
+            <a:off x="320042" y="2319868"/>
+            <a:ext cx="2828131" cy="4214708"/>
           </a:xfrm>
         </p:spPr>
         <p:txBody>
@@ -1614,8 +1614,8 @@
         </p:nvSpPr>
         <p:spPr>
           <a:xfrm>
-            <a:off x="3251518" y="1862747"/>
-            <a:ext cx="2829243" cy="776304"/>
+            <a:off x="3251519" y="1637455"/>
+            <a:ext cx="2829243" cy="682413"/>
           </a:xfrm>
         </p:spPr>
         <p:txBody>
@@ -1679,8 +1679,8 @@
         </p:nvSpPr>
         <p:spPr>
           <a:xfrm>
-            <a:off x="3251518" y="2639051"/>
-            <a:ext cx="2829243" cy="4794596"/>
+            <a:off x="3251519" y="2319868"/>
+            <a:ext cx="2829243" cy="4214708"/>
           </a:xfrm>
         </p:spPr>
         <p:txBody>
@@ -1769,7 +1769,7 @@
           <a:p>
             <a:fld id="{C040166C-2A5C-4A05-AE69-597178BFE27B}" type="datetimeFigureOut">
               <a:rPr lang="en-US" smtClean="0"/>
-              <a:t>8/4/2016</a:t>
+              <a:t>8/9/16</a:t>
             </a:fld>
             <a:endParaRPr lang="en-US"/>
           </a:p>
@@ -1887,7 +1887,7 @@
           <a:p>
             <a:fld id="{C040166C-2A5C-4A05-AE69-597178BFE27B}" type="datetimeFigureOut">
               <a:rPr lang="en-US" smtClean="0"/>
-              <a:t>8/4/2016</a:t>
+              <a:t>8/9/16</a:t>
             </a:fld>
             <a:endParaRPr lang="en-US"/>
           </a:p>
@@ -1982,7 +1982,7 @@
           <a:p>
             <a:fld id="{C040166C-2A5C-4A05-AE69-597178BFE27B}" type="datetimeFigureOut">
               <a:rPr lang="en-US" smtClean="0"/>
-              <a:t>8/4/2016</a:t>
+              <a:t>8/9/16</a:t>
             </a:fld>
             <a:endParaRPr lang="en-US"/>
           </a:p>
@@ -2072,8 +2072,8 @@
         </p:nvSpPr>
         <p:spPr>
           <a:xfrm>
-            <a:off x="320041" y="331326"/>
-            <a:ext cx="2105819" cy="1410062"/>
+            <a:off x="320042" y="291254"/>
+            <a:ext cx="2105819" cy="1239520"/>
           </a:xfrm>
         </p:spPr>
         <p:txBody>
@@ -2104,8 +2104,8 @@
         </p:nvSpPr>
         <p:spPr>
           <a:xfrm>
-            <a:off x="2502536" y="331331"/>
-            <a:ext cx="3578225" cy="7102318"/>
+            <a:off x="2502537" y="291258"/>
+            <a:ext cx="3578225" cy="6243320"/>
           </a:xfrm>
         </p:spPr>
         <p:txBody>
@@ -2189,8 +2189,8 @@
         </p:nvSpPr>
         <p:spPr>
           <a:xfrm>
-            <a:off x="320041" y="1741392"/>
-            <a:ext cx="2105819" cy="5692257"/>
+            <a:off x="320042" y="1530778"/>
+            <a:ext cx="2105819" cy="5003800"/>
           </a:xfrm>
         </p:spPr>
         <p:txBody>
@@ -2259,7 +2259,7 @@
           <a:p>
             <a:fld id="{C040166C-2A5C-4A05-AE69-597178BFE27B}" type="datetimeFigureOut">
               <a:rPr lang="en-US" smtClean="0"/>
-              <a:t>8/4/2016</a:t>
+              <a:t>8/9/16</a:t>
             </a:fld>
             <a:endParaRPr lang="en-US"/>
           </a:p>
@@ -2349,8 +2349,8 @@
         </p:nvSpPr>
         <p:spPr>
           <a:xfrm>
-            <a:off x="1254602" y="5825177"/>
-            <a:ext cx="3840480" cy="687694"/>
+            <a:off x="1254602" y="5120644"/>
+            <a:ext cx="3840480" cy="604520"/>
           </a:xfrm>
         </p:spPr>
         <p:txBody>
@@ -2381,8 +2381,8 @@
         </p:nvSpPr>
         <p:spPr>
           <a:xfrm>
-            <a:off x="1254602" y="743557"/>
-            <a:ext cx="3840480" cy="4993005"/>
+            <a:off x="1254602" y="653627"/>
+            <a:ext cx="3840480" cy="4389120"/>
           </a:xfrm>
         </p:spPr>
         <p:txBody>
@@ -2442,8 +2442,8 @@
         </p:nvSpPr>
         <p:spPr>
           <a:xfrm>
-            <a:off x="1254602" y="6512871"/>
-            <a:ext cx="3840480" cy="976641"/>
+            <a:off x="1254602" y="5725164"/>
+            <a:ext cx="3840480" cy="858520"/>
           </a:xfrm>
         </p:spPr>
         <p:txBody>
@@ -2512,7 +2512,7 @@
           <a:p>
             <a:fld id="{C040166C-2A5C-4A05-AE69-597178BFE27B}" type="datetimeFigureOut">
               <a:rPr lang="en-US" smtClean="0"/>
-              <a:t>8/4/2016</a:t>
+              <a:t>8/9/16</a:t>
             </a:fld>
             <a:endParaRPr lang="en-US"/>
           </a:p>
@@ -2607,8 +2607,8 @@
         </p:nvSpPr>
         <p:spPr>
           <a:xfrm>
-            <a:off x="320040" y="333253"/>
-            <a:ext cx="5760720" cy="1386946"/>
+            <a:off x="320040" y="292947"/>
+            <a:ext cx="5760720" cy="1219200"/>
           </a:xfrm>
           <a:prstGeom prst="rect">
             <a:avLst/>
@@ -2640,8 +2640,8 @@
         </p:nvSpPr>
         <p:spPr>
           <a:xfrm>
-            <a:off x="320040" y="1941725"/>
-            <a:ext cx="5760720" cy="5491921"/>
+            <a:off x="320040" y="1706881"/>
+            <a:ext cx="5760720" cy="4827694"/>
           </a:xfrm>
           <a:prstGeom prst="rect">
             <a:avLst/>
@@ -2702,8 +2702,8 @@
         </p:nvSpPr>
         <p:spPr>
           <a:xfrm>
-            <a:off x="320040" y="7712965"/>
-            <a:ext cx="1493520" cy="443052"/>
+            <a:off x="320040" y="6780111"/>
+            <a:ext cx="1493520" cy="389467"/>
           </a:xfrm>
           <a:prstGeom prst="rect">
             <a:avLst/>
@@ -2725,7 +2725,7 @@
           <a:p>
             <a:fld id="{C040166C-2A5C-4A05-AE69-597178BFE27B}" type="datetimeFigureOut">
               <a:rPr lang="en-US" smtClean="0"/>
-              <a:t>8/4/2016</a:t>
+              <a:t>8/9/16</a:t>
             </a:fld>
             <a:endParaRPr lang="en-US"/>
           </a:p>
@@ -2743,8 +2743,8 @@
         </p:nvSpPr>
         <p:spPr>
           <a:xfrm>
-            <a:off x="2186940" y="7712965"/>
-            <a:ext cx="2026920" cy="443052"/>
+            <a:off x="2186940" y="6780111"/>
+            <a:ext cx="2026920" cy="389467"/>
           </a:xfrm>
           <a:prstGeom prst="rect">
             <a:avLst/>
@@ -2780,8 +2780,8 @@
         </p:nvSpPr>
         <p:spPr>
           <a:xfrm>
-            <a:off x="4587240" y="7712965"/>
-            <a:ext cx="1493520" cy="443052"/>
+            <a:off x="4587240" y="6780111"/>
+            <a:ext cx="1493520" cy="389467"/>
           </a:xfrm>
           <a:prstGeom prst="rect">
             <a:avLst/>
@@ -3102,7 +3102,7 @@
       </p:grpSpPr>
       <p:pic>
         <p:nvPicPr>
-          <p:cNvPr id="72" name="Picture 2"/>
+          <p:cNvPr id="19" name="Picture 2"/>
           <p:cNvPicPr>
             <a:picLocks noChangeAspect="1" noChangeArrowheads="1"/>
           </p:cNvPicPr>
@@ -3121,7 +3121,7 @@
         </p:blipFill>
         <p:spPr bwMode="auto">
           <a:xfrm rot="5400000">
-            <a:off x="-945826" y="959106"/>
+            <a:off x="-945826" y="656968"/>
             <a:ext cx="8324335" cy="6400800"/>
           </a:xfrm>
           <a:prstGeom prst="rect">
@@ -3133,14 +3133,14 @@
           </a:ln>
           <a:effectLst/>
           <a:extLst>
-            <a:ext uri="{909E8E84-426E-40DD-AFC4-6F175D3DCCD1}">
+            <a:ext uri="{909E8E84-426E-40dd-AFC4-6F175D3DCCD1}">
               <a14:hiddenFill xmlns:a14="http://schemas.microsoft.com/office/drawing/2010/main">
                 <a:solidFill>
                   <a:schemeClr val="accent1"/>
                 </a:solidFill>
               </a14:hiddenFill>
             </a:ext>
-            <a:ext uri="{91240B29-F687-4F45-9708-019B960494DF}">
+            <a:ext uri="{91240B29-F687-4f45-9708-019B960494DF}">
               <a14:hiddenLine xmlns:a14="http://schemas.microsoft.com/office/drawing/2010/main" w="9525">
                 <a:solidFill>
                   <a:schemeClr val="tx1"/>
@@ -3150,7 +3150,7 @@
                 <a:tailEnd/>
               </a14:hiddenLine>
             </a:ext>
-            <a:ext uri="{AF507438-7753-43E0-B8FC-AC1667EBCBE1}">
+            <a:ext uri="{AF507438-7753-43e0-B8FC-AC1667EBCBE1}">
               <a14:hiddenEffects xmlns:a14="http://schemas.microsoft.com/office/drawing/2010/main">
                 <a:effectLst>
                   <a:outerShdw dist="35921" dir="2700000" algn="ctr" rotWithShape="0">
@@ -3164,13 +3164,13 @@
       </p:pic>
       <p:cxnSp>
         <p:nvCxnSpPr>
-          <p:cNvPr id="73" name="Straight Arrow Connector 72"/>
+          <p:cNvPr id="20" name="Straight Arrow Connector 19"/>
           <p:cNvCxnSpPr/>
           <p:nvPr/>
         </p:nvCxnSpPr>
         <p:spPr>
           <a:xfrm flipH="1">
-            <a:off x="4242803" y="7341868"/>
+            <a:off x="4242803" y="7039730"/>
             <a:ext cx="628898" cy="136162"/>
           </a:xfrm>
           <a:prstGeom prst="straightConnector1">
@@ -3213,13 +3213,13 @@
       </p:cxnSp>
       <p:cxnSp>
         <p:nvCxnSpPr>
-          <p:cNvPr id="74" name="Straight Arrow Connector 73"/>
+          <p:cNvPr id="21" name="Straight Arrow Connector 20"/>
           <p:cNvCxnSpPr/>
           <p:nvPr/>
         </p:nvCxnSpPr>
         <p:spPr>
           <a:xfrm>
-            <a:off x="2895600" y="1412112"/>
+            <a:off x="2895600" y="1109974"/>
             <a:ext cx="1526061" cy="2512728"/>
           </a:xfrm>
           <a:prstGeom prst="straightConnector1">
@@ -3262,13 +3262,13 @@
       </p:cxnSp>
       <p:cxnSp>
         <p:nvCxnSpPr>
-          <p:cNvPr id="75" name="Straight Arrow Connector 74"/>
+          <p:cNvPr id="22" name="Straight Arrow Connector 21"/>
           <p:cNvCxnSpPr/>
           <p:nvPr/>
         </p:nvCxnSpPr>
         <p:spPr>
           <a:xfrm flipH="1" flipV="1">
-            <a:off x="4979443" y="4280089"/>
+            <a:off x="4979443" y="3977951"/>
             <a:ext cx="354557" cy="1472796"/>
           </a:xfrm>
           <a:prstGeom prst="straightConnector1">
@@ -3311,13 +3311,13 @@
       </p:cxnSp>
       <p:cxnSp>
         <p:nvCxnSpPr>
-          <p:cNvPr id="76" name="Straight Arrow Connector 75"/>
+          <p:cNvPr id="23" name="Straight Arrow Connector 22"/>
           <p:cNvCxnSpPr/>
           <p:nvPr/>
         </p:nvCxnSpPr>
         <p:spPr>
           <a:xfrm flipH="1" flipV="1">
-            <a:off x="4312119" y="6433248"/>
+            <a:off x="4312119" y="6131110"/>
             <a:ext cx="1021881" cy="593577"/>
           </a:xfrm>
           <a:prstGeom prst="straightConnector1">
@@ -3360,13 +3360,13 @@
       </p:cxnSp>
       <p:cxnSp>
         <p:nvCxnSpPr>
-          <p:cNvPr id="77" name="Straight Arrow Connector 76"/>
+          <p:cNvPr id="24" name="Straight Arrow Connector 23"/>
           <p:cNvCxnSpPr/>
           <p:nvPr/>
         </p:nvCxnSpPr>
         <p:spPr>
           <a:xfrm flipV="1">
-            <a:off x="1073037" y="5593688"/>
+            <a:off x="1073037" y="5291550"/>
             <a:ext cx="716617" cy="1028078"/>
           </a:xfrm>
           <a:prstGeom prst="straightConnector1">
@@ -3409,13 +3409,13 @@
       </p:cxnSp>
       <p:cxnSp>
         <p:nvCxnSpPr>
-          <p:cNvPr id="78" name="Straight Arrow Connector 77"/>
+          <p:cNvPr id="25" name="Straight Arrow Connector 24"/>
           <p:cNvCxnSpPr/>
           <p:nvPr/>
         </p:nvCxnSpPr>
         <p:spPr>
           <a:xfrm>
-            <a:off x="1208691" y="3924840"/>
+            <a:off x="1208691" y="3622702"/>
             <a:ext cx="1839309" cy="528010"/>
           </a:xfrm>
           <a:prstGeom prst="straightConnector1">
@@ -3458,13 +3458,13 @@
       </p:cxnSp>
       <p:cxnSp>
         <p:nvCxnSpPr>
-          <p:cNvPr id="79" name="Straight Arrow Connector 78"/>
+          <p:cNvPr id="26" name="Straight Arrow Connector 25"/>
           <p:cNvCxnSpPr/>
           <p:nvPr/>
         </p:nvCxnSpPr>
         <p:spPr>
           <a:xfrm>
-            <a:off x="1600200" y="2345310"/>
+            <a:off x="1600200" y="2043172"/>
             <a:ext cx="1777852" cy="2107539"/>
           </a:xfrm>
           <a:prstGeom prst="straightConnector1">
@@ -3507,13 +3507,13 @@
       </p:cxnSp>
       <p:cxnSp>
         <p:nvCxnSpPr>
-          <p:cNvPr id="80" name="Straight Arrow Connector 79"/>
+          <p:cNvPr id="27" name="Straight Arrow Connector 26"/>
           <p:cNvCxnSpPr/>
           <p:nvPr/>
         </p:nvCxnSpPr>
         <p:spPr>
           <a:xfrm flipV="1">
-            <a:off x="2548092" y="5014047"/>
+            <a:off x="2548092" y="4711909"/>
             <a:ext cx="1191238" cy="2143155"/>
           </a:xfrm>
           <a:prstGeom prst="straightConnector1">
@@ -3556,13 +3556,13 @@
       </p:cxnSp>
       <p:sp>
         <p:nvSpPr>
-          <p:cNvPr id="81" name="TextBox 80"/>
+          <p:cNvPr id="28" name="TextBox 27"/>
           <p:cNvSpPr txBox="1"/>
           <p:nvPr/>
         </p:nvSpPr>
         <p:spPr>
           <a:xfrm>
-            <a:off x="4490357" y="692373"/>
+            <a:off x="4490357" y="390235"/>
             <a:ext cx="1181157" cy="369332"/>
           </a:xfrm>
           <a:prstGeom prst="rect">
@@ -3594,7 +3594,7 @@
                 <a:latin typeface="Times"/>
                 <a:cs typeface="Times"/>
               </a:rPr>
-              <a:t>End Goal</a:t>
+              <a:t>Goal</a:t>
             </a:r>
             <a:endParaRPr lang="en-US" dirty="0">
               <a:latin typeface="Times"/>
@@ -3605,13 +3605,13 @@
       </p:sp>
       <p:sp>
         <p:nvSpPr>
-          <p:cNvPr id="82" name="TextBox 81"/>
+          <p:cNvPr id="29" name="TextBox 28"/>
           <p:cNvSpPr txBox="1"/>
           <p:nvPr/>
         </p:nvSpPr>
         <p:spPr>
           <a:xfrm>
-            <a:off x="287072" y="1698979"/>
+            <a:off x="287072" y="1396841"/>
             <a:ext cx="1843237" cy="646331"/>
           </a:xfrm>
           <a:prstGeom prst="rect">
@@ -3654,13 +3654,13 @@
       </p:sp>
       <p:sp>
         <p:nvSpPr>
-          <p:cNvPr id="83" name="TextBox 82"/>
+          <p:cNvPr id="30" name="TextBox 29"/>
           <p:cNvSpPr txBox="1"/>
           <p:nvPr/>
         </p:nvSpPr>
         <p:spPr>
           <a:xfrm>
-            <a:off x="1718133" y="1042780"/>
+            <a:off x="1718133" y="740642"/>
             <a:ext cx="1659919" cy="369332"/>
           </a:xfrm>
           <a:prstGeom prst="rect">
@@ -3703,13 +3703,13 @@
       </p:sp>
       <p:sp>
         <p:nvSpPr>
-          <p:cNvPr id="84" name="TextBox 83"/>
+          <p:cNvPr id="31" name="TextBox 30"/>
           <p:cNvSpPr txBox="1"/>
           <p:nvPr/>
         </p:nvSpPr>
         <p:spPr>
           <a:xfrm>
-            <a:off x="4557252" y="5752084"/>
+            <a:off x="4557252" y="5449946"/>
             <a:ext cx="1739563" cy="646331"/>
           </a:xfrm>
           <a:prstGeom prst="rect">
@@ -3752,13 +3752,13 @@
       </p:sp>
       <p:sp>
         <p:nvSpPr>
-          <p:cNvPr id="85" name="TextBox 84"/>
+          <p:cNvPr id="32" name="TextBox 31"/>
           <p:cNvSpPr txBox="1"/>
           <p:nvPr/>
         </p:nvSpPr>
         <p:spPr>
           <a:xfrm>
-            <a:off x="277641" y="3375996"/>
+            <a:off x="277641" y="3073858"/>
             <a:ext cx="1119163" cy="369332"/>
           </a:xfrm>
           <a:prstGeom prst="rect">
@@ -3801,13 +3801,13 @@
       </p:sp>
       <p:sp>
         <p:nvSpPr>
-          <p:cNvPr id="86" name="TextBox 85"/>
+          <p:cNvPr id="33" name="TextBox 32"/>
           <p:cNvSpPr txBox="1"/>
           <p:nvPr/>
         </p:nvSpPr>
         <p:spPr>
           <a:xfrm>
-            <a:off x="1718133" y="7157202"/>
+            <a:off x="1718133" y="6855064"/>
             <a:ext cx="1813111" cy="369332"/>
           </a:xfrm>
           <a:prstGeom prst="rect">
@@ -3850,13 +3850,13 @@
       </p:sp>
       <p:sp>
         <p:nvSpPr>
-          <p:cNvPr id="87" name="TextBox 86"/>
+          <p:cNvPr id="34" name="TextBox 33"/>
           <p:cNvSpPr txBox="1"/>
           <p:nvPr/>
         </p:nvSpPr>
         <p:spPr>
           <a:xfrm>
-            <a:off x="4950061" y="7026825"/>
+            <a:off x="4950061" y="6724687"/>
             <a:ext cx="1250000" cy="369332"/>
           </a:xfrm>
           <a:prstGeom prst="rect">
@@ -3899,13 +3899,13 @@
       </p:sp>
       <p:sp>
         <p:nvSpPr>
-          <p:cNvPr id="88" name="TextBox 87"/>
+          <p:cNvPr id="35" name="TextBox 34"/>
           <p:cNvSpPr txBox="1"/>
           <p:nvPr/>
         </p:nvSpPr>
         <p:spPr>
           <a:xfrm>
-            <a:off x="111802" y="6730036"/>
+            <a:off x="111802" y="6427898"/>
             <a:ext cx="1450839" cy="369332"/>
           </a:xfrm>
           <a:prstGeom prst="rect">

</xml_diff>